<commit_message>
updated milestone 3 documentation
</commit_message>
<xml_diff>
--- a/Docs/Diagrams/ASP_Overview_Diagram.pptx
+++ b/Docs/Diagrams/ASP_Overview_Diagram.pptx
@@ -5,9 +5,11 @@
     <p:sldMasterId id="2147483648" r:id="rId1"/>
   </p:sldMasterIdLst>
   <p:sldIdLst>
-    <p:sldId id="256" r:id="rId2"/>
-    <p:sldId id="257" r:id="rId3"/>
-    <p:sldId id="258" r:id="rId4"/>
+    <p:sldId id="259" r:id="rId2"/>
+    <p:sldId id="260" r:id="rId3"/>
+    <p:sldId id="256" r:id="rId4"/>
+    <p:sldId id="257" r:id="rId5"/>
+    <p:sldId id="258" r:id="rId6"/>
   </p:sldIdLst>
   <p:sldSz cx="12192000" cy="6858000"/>
   <p:notesSz cx="6858000" cy="9144000"/>
@@ -334,7 +336,7 @@
           <a:p>
             <a:fld id="{61C5D684-0D82-42A9-BC35-11D6D60B72F1}" type="datetimeFigureOut">
               <a:rPr lang="es-ES" smtClean="0"/>
-              <a:t>24/02/2020</a:t>
+              <a:t>30/04/2020</a:t>
             </a:fld>
             <a:endParaRPr lang="es-ES"/>
           </a:p>
@@ -532,7 +534,7 @@
           <a:p>
             <a:fld id="{61C5D684-0D82-42A9-BC35-11D6D60B72F1}" type="datetimeFigureOut">
               <a:rPr lang="es-ES" smtClean="0"/>
-              <a:t>24/02/2020</a:t>
+              <a:t>30/04/2020</a:t>
             </a:fld>
             <a:endParaRPr lang="es-ES"/>
           </a:p>
@@ -740,7 +742,7 @@
           <a:p>
             <a:fld id="{61C5D684-0D82-42A9-BC35-11D6D60B72F1}" type="datetimeFigureOut">
               <a:rPr lang="es-ES" smtClean="0"/>
-              <a:t>24/02/2020</a:t>
+              <a:t>30/04/2020</a:t>
             </a:fld>
             <a:endParaRPr lang="es-ES"/>
           </a:p>
@@ -938,7 +940,7 @@
           <a:p>
             <a:fld id="{61C5D684-0D82-42A9-BC35-11D6D60B72F1}" type="datetimeFigureOut">
               <a:rPr lang="es-ES" smtClean="0"/>
-              <a:t>24/02/2020</a:t>
+              <a:t>30/04/2020</a:t>
             </a:fld>
             <a:endParaRPr lang="es-ES"/>
           </a:p>
@@ -1213,7 +1215,7 @@
           <a:p>
             <a:fld id="{61C5D684-0D82-42A9-BC35-11D6D60B72F1}" type="datetimeFigureOut">
               <a:rPr lang="es-ES" smtClean="0"/>
-              <a:t>24/02/2020</a:t>
+              <a:t>30/04/2020</a:t>
             </a:fld>
             <a:endParaRPr lang="es-ES"/>
           </a:p>
@@ -1478,7 +1480,7 @@
           <a:p>
             <a:fld id="{61C5D684-0D82-42A9-BC35-11D6D60B72F1}" type="datetimeFigureOut">
               <a:rPr lang="es-ES" smtClean="0"/>
-              <a:t>24/02/2020</a:t>
+              <a:t>30/04/2020</a:t>
             </a:fld>
             <a:endParaRPr lang="es-ES"/>
           </a:p>
@@ -1890,7 +1892,7 @@
           <a:p>
             <a:fld id="{61C5D684-0D82-42A9-BC35-11D6D60B72F1}" type="datetimeFigureOut">
               <a:rPr lang="es-ES" smtClean="0"/>
-              <a:t>24/02/2020</a:t>
+              <a:t>30/04/2020</a:t>
             </a:fld>
             <a:endParaRPr lang="es-ES"/>
           </a:p>
@@ -2031,7 +2033,7 @@
           <a:p>
             <a:fld id="{61C5D684-0D82-42A9-BC35-11D6D60B72F1}" type="datetimeFigureOut">
               <a:rPr lang="es-ES" smtClean="0"/>
-              <a:t>24/02/2020</a:t>
+              <a:t>30/04/2020</a:t>
             </a:fld>
             <a:endParaRPr lang="es-ES"/>
           </a:p>
@@ -2144,7 +2146,7 @@
           <a:p>
             <a:fld id="{61C5D684-0D82-42A9-BC35-11D6D60B72F1}" type="datetimeFigureOut">
               <a:rPr lang="es-ES" smtClean="0"/>
-              <a:t>24/02/2020</a:t>
+              <a:t>30/04/2020</a:t>
             </a:fld>
             <a:endParaRPr lang="es-ES"/>
           </a:p>
@@ -2455,7 +2457,7 @@
           <a:p>
             <a:fld id="{61C5D684-0D82-42A9-BC35-11D6D60B72F1}" type="datetimeFigureOut">
               <a:rPr lang="es-ES" smtClean="0"/>
-              <a:t>24/02/2020</a:t>
+              <a:t>30/04/2020</a:t>
             </a:fld>
             <a:endParaRPr lang="es-ES"/>
           </a:p>
@@ -2743,7 +2745,7 @@
           <a:p>
             <a:fld id="{61C5D684-0D82-42A9-BC35-11D6D60B72F1}" type="datetimeFigureOut">
               <a:rPr lang="es-ES" smtClean="0"/>
-              <a:t>24/02/2020</a:t>
+              <a:t>30/04/2020</a:t>
             </a:fld>
             <a:endParaRPr lang="es-ES"/>
           </a:p>
@@ -2984,7 +2986,7 @@
           <a:p>
             <a:fld id="{61C5D684-0D82-42A9-BC35-11D6D60B72F1}" type="datetimeFigureOut">
               <a:rPr lang="es-ES" smtClean="0"/>
-              <a:t>24/02/2020</a:t>
+              <a:t>30/04/2020</a:t>
             </a:fld>
             <a:endParaRPr lang="es-ES"/>
           </a:p>
@@ -3401,6 +3403,188 @@
           <a:chExt cx="0" cy="0"/>
         </a:xfrm>
       </p:grpSpPr>
+      <p:sp>
+        <p:nvSpPr>
+          <p:cNvPr id="2" name="Título 1">
+            <a:extLst>
+              <a:ext uri="{FF2B5EF4-FFF2-40B4-BE49-F238E27FC236}">
+                <a16:creationId xmlns:a16="http://schemas.microsoft.com/office/drawing/2014/main" id="{76F674B4-D964-4D86-A249-72C15A99C004}"/>
+              </a:ext>
+            </a:extLst>
+          </p:cNvPr>
+          <p:cNvSpPr>
+            <a:spLocks noGrp="1"/>
+          </p:cNvSpPr>
+          <p:nvPr>
+            <p:ph type="title"/>
+          </p:nvPr>
+        </p:nvSpPr>
+        <p:spPr/>
+        <p:txBody>
+          <a:bodyPr/>
+          <a:lstStyle/>
+          <a:p>
+            <a:r>
+              <a:rPr lang="en-US" dirty="0"/>
+              <a:t>Before</a:t>
+            </a:r>
+            <a:endParaRPr lang="es-ES" dirty="0"/>
+          </a:p>
+        </p:txBody>
+      </p:sp>
+      <p:pic>
+        <p:nvPicPr>
+          <p:cNvPr id="9" name="Marcador de contenido 8">
+            <a:extLst>
+              <a:ext uri="{FF2B5EF4-FFF2-40B4-BE49-F238E27FC236}">
+                <a16:creationId xmlns:a16="http://schemas.microsoft.com/office/drawing/2014/main" id="{DF29F16F-6850-48DF-8E79-241AE435B140}"/>
+              </a:ext>
+            </a:extLst>
+          </p:cNvPr>
+          <p:cNvPicPr>
+            <a:picLocks noGrp="1" noChangeAspect="1"/>
+          </p:cNvPicPr>
+          <p:nvPr>
+            <p:ph idx="1"/>
+          </p:nvPr>
+        </p:nvPicPr>
+        <p:blipFill>
+          <a:blip r:embed="rId2"/>
+          <a:stretch>
+            <a:fillRect/>
+          </a:stretch>
+        </p:blipFill>
+        <p:spPr>
+          <a:xfrm>
+            <a:off x="2443060" y="365090"/>
+            <a:ext cx="7305879" cy="6127785"/>
+          </a:xfrm>
+          <a:prstGeom prst="rect">
+            <a:avLst/>
+          </a:prstGeom>
+        </p:spPr>
+      </p:pic>
+    </p:spTree>
+    <p:extLst>
+      <p:ext uri="{BB962C8B-B14F-4D97-AF65-F5344CB8AC3E}">
+        <p14:creationId xmlns:p14="http://schemas.microsoft.com/office/powerpoint/2010/main" val="207532637"/>
+      </p:ext>
+    </p:extLst>
+  </p:cSld>
+  <p:clrMapOvr>
+    <a:masterClrMapping/>
+  </p:clrMapOvr>
+</p:sld>
+</file>
+
+<file path=ppt/slides/slide2.xml><?xml version="1.0" encoding="utf-8"?>
+<p:sld xmlns:a="http://schemas.openxmlformats.org/drawingml/2006/main" xmlns:r="http://schemas.openxmlformats.org/officeDocument/2006/relationships" xmlns:p="http://schemas.openxmlformats.org/presentationml/2006/main">
+  <p:cSld>
+    <p:spTree>
+      <p:nvGrpSpPr>
+        <p:cNvPr id="1" name=""/>
+        <p:cNvGrpSpPr/>
+        <p:nvPr/>
+      </p:nvGrpSpPr>
+      <p:grpSpPr>
+        <a:xfrm>
+          <a:off x="0" y="0"/>
+          <a:ext cx="0" cy="0"/>
+          <a:chOff x="0" y="0"/>
+          <a:chExt cx="0" cy="0"/>
+        </a:xfrm>
+      </p:grpSpPr>
+      <p:sp>
+        <p:nvSpPr>
+          <p:cNvPr id="2" name="Título 1">
+            <a:extLst>
+              <a:ext uri="{FF2B5EF4-FFF2-40B4-BE49-F238E27FC236}">
+                <a16:creationId xmlns:a16="http://schemas.microsoft.com/office/drawing/2014/main" id="{F3DA2ED0-D67D-44BE-A887-6454014340F8}"/>
+              </a:ext>
+            </a:extLst>
+          </p:cNvPr>
+          <p:cNvSpPr>
+            <a:spLocks noGrp="1"/>
+          </p:cNvSpPr>
+          <p:nvPr>
+            <p:ph type="title"/>
+          </p:nvPr>
+        </p:nvSpPr>
+        <p:spPr/>
+        <p:txBody>
+          <a:bodyPr/>
+          <a:lstStyle/>
+          <a:p>
+            <a:r>
+              <a:rPr lang="en-US" dirty="0"/>
+              <a:t>After</a:t>
+            </a:r>
+            <a:endParaRPr lang="es-ES" dirty="0"/>
+          </a:p>
+        </p:txBody>
+      </p:sp>
+      <p:pic>
+        <p:nvPicPr>
+          <p:cNvPr id="4" name="Marcador de contenido 3">
+            <a:extLst>
+              <a:ext uri="{FF2B5EF4-FFF2-40B4-BE49-F238E27FC236}">
+                <a16:creationId xmlns:a16="http://schemas.microsoft.com/office/drawing/2014/main" id="{533CFCF6-74CE-4A88-B2A8-746E608DBE46}"/>
+              </a:ext>
+            </a:extLst>
+          </p:cNvPr>
+          <p:cNvPicPr>
+            <a:picLocks noGrp="1" noChangeAspect="1"/>
+          </p:cNvPicPr>
+          <p:nvPr>
+            <p:ph idx="1"/>
+          </p:nvPr>
+        </p:nvPicPr>
+        <p:blipFill>
+          <a:blip r:embed="rId2"/>
+          <a:stretch>
+            <a:fillRect/>
+          </a:stretch>
+        </p:blipFill>
+        <p:spPr>
+          <a:xfrm>
+            <a:off x="2081463" y="481289"/>
+            <a:ext cx="7507706" cy="5895422"/>
+          </a:xfrm>
+          <a:prstGeom prst="rect">
+            <a:avLst/>
+          </a:prstGeom>
+        </p:spPr>
+      </p:pic>
+    </p:spTree>
+    <p:extLst>
+      <p:ext uri="{BB962C8B-B14F-4D97-AF65-F5344CB8AC3E}">
+        <p14:creationId xmlns:p14="http://schemas.microsoft.com/office/powerpoint/2010/main" val="2523776418"/>
+      </p:ext>
+    </p:extLst>
+  </p:cSld>
+  <p:clrMapOvr>
+    <a:masterClrMapping/>
+  </p:clrMapOvr>
+</p:sld>
+</file>
+
+<file path=ppt/slides/slide3.xml><?xml version="1.0" encoding="utf-8"?>
+<p:sld xmlns:a="http://schemas.openxmlformats.org/drawingml/2006/main" xmlns:r="http://schemas.openxmlformats.org/officeDocument/2006/relationships" xmlns:p="http://schemas.openxmlformats.org/presentationml/2006/main">
+  <p:cSld>
+    <p:spTree>
+      <p:nvGrpSpPr>
+        <p:cNvPr id="1" name=""/>
+        <p:cNvGrpSpPr/>
+        <p:nvPr/>
+      </p:nvGrpSpPr>
+      <p:grpSpPr>
+        <a:xfrm>
+          <a:off x="0" y="0"/>
+          <a:ext cx="0" cy="0"/>
+          <a:chOff x="0" y="0"/>
+          <a:chExt cx="0" cy="0"/>
+        </a:xfrm>
+      </p:grpSpPr>
       <p:pic>
         <p:nvPicPr>
           <p:cNvPr id="5" name="Imagen 4" descr="Imagen que contiene dibujo&#10;&#10;Descripción generada automáticamente">
@@ -4468,7 +4652,7 @@
 </p:sld>
 </file>
 
-<file path=ppt/slides/slide2.xml><?xml version="1.0" encoding="utf-8"?>
+<file path=ppt/slides/slide4.xml><?xml version="1.0" encoding="utf-8"?>
 <p:sld xmlns:a="http://schemas.openxmlformats.org/drawingml/2006/main" xmlns:r="http://schemas.openxmlformats.org/officeDocument/2006/relationships" xmlns:p="http://schemas.openxmlformats.org/presentationml/2006/main">
   <p:cSld>
     <p:spTree>
@@ -4992,7 +5176,7 @@
 </p:sld>
 </file>
 
-<file path=ppt/slides/slide3.xml><?xml version="1.0" encoding="utf-8"?>
+<file path=ppt/slides/slide5.xml><?xml version="1.0" encoding="utf-8"?>
 <p:sld xmlns:a="http://schemas.openxmlformats.org/drawingml/2006/main" xmlns:r="http://schemas.openxmlformats.org/officeDocument/2006/relationships" xmlns:p="http://schemas.openxmlformats.org/presentationml/2006/main">
   <p:cSld>
     <p:spTree>

</xml_diff>